<commit_message>
add some texts to ppt
</commit_message>
<xml_diff>
--- a/Project2/pre/deephash.pptx
+++ b/Project2/pre/deephash.pptx
@@ -113,6 +113,11 @@
       </a:defRPr>
     </a:lvl9pPr>
   </p:defaultTextStyle>
+  <p:extLst>
+    <p:ext uri="{EFAFB233-063F-42B5-8137-9DF3F51BA10A}">
+      <p15:sldGuideLst xmlns:p15="http://schemas.microsoft.com/office/powerpoint/2012/main"/>
+    </p:ext>
+  </p:extLst>
 </p:presentation>
 </file>
 
@@ -3575,6 +3580,52 @@
           </a:p>
         </p:txBody>
       </p:sp>
+      <p:sp>
+        <p:nvSpPr>
+          <p:cNvPr id="3" name="TextBox 2"/>
+          <p:cNvSpPr txBox="1"/>
+          <p:nvPr/>
+        </p:nvSpPr>
+        <p:spPr>
+          <a:xfrm>
+            <a:off x="838199" y="1890668"/>
+            <a:ext cx="6297891" cy="461665"/>
+          </a:xfrm>
+          <a:prstGeom prst="rect">
+            <a:avLst/>
+          </a:prstGeom>
+          <a:noFill/>
+        </p:spPr>
+        <p:txBody>
+          <a:bodyPr wrap="square" rtlCol="0">
+            <a:spAutoFit/>
+          </a:bodyPr>
+          <a:lstStyle/>
+          <a:p>
+            <a:r>
+              <a:rPr lang="en-US" sz="2400" dirty="0" smtClean="0">
+                <a:solidFill>
+                  <a:schemeClr val="bg1"/>
+                </a:solidFill>
+              </a:rPr>
+              <a:t>P</a:t>
+            </a:r>
+            <a:r>
+              <a:rPr lang="en-US" altLang="zh-CN" sz="2400" dirty="0" smtClean="0">
+                <a:solidFill>
+                  <a:schemeClr val="bg1"/>
+                </a:solidFill>
+              </a:rPr>
+              <a:t>re-trained AlexNet + two fc (to be trained)</a:t>
+            </a:r>
+            <a:endParaRPr lang="en-US" sz="2400" dirty="0">
+              <a:solidFill>
+                <a:schemeClr val="bg1"/>
+              </a:solidFill>
+            </a:endParaRPr>
+          </a:p>
+        </p:txBody>
+      </p:sp>
     </p:spTree>
     <p:extLst>
       <p:ext uri="{BB962C8B-B14F-4D97-AF65-F5344CB8AC3E}">
@@ -3766,8 +3817,8 @@
           </a:p>
         </p:txBody>
       </p:sp>
-      <mc:AlternateContent xmlns:mc="http://schemas.openxmlformats.org/markup-compatibility/2006">
-        <mc:Choice xmlns:a14="http://schemas.microsoft.com/office/drawing/2010/main" Requires="a14">
+      <mc:AlternateContent xmlns:mc="http://schemas.openxmlformats.org/markup-compatibility/2006" xmlns:a14="http://schemas.microsoft.com/office/drawing/2010/main">
+        <mc:Choice Requires="a14">
           <p:sp>
             <p:nvSpPr>
               <p:cNvPr id="3" name="Content Placeholder 2"/>
@@ -4121,7 +4172,7 @@
             </p:txBody>
           </p:sp>
         </mc:Choice>
-        <mc:Fallback>
+        <mc:Fallback xmlns="">
           <p:sp>
             <p:nvSpPr>
               <p:cNvPr id="3" name="Content Placeholder 2"/>

</xml_diff>